<commit_message>
modify user get and userpost get
</commit_message>
<xml_diff>
--- a/aliinfo.pptx
+++ b/aliinfo.pptx
@@ -251,7 +251,7 @@
           <a:p>
             <a:fld id="{3CEB5F84-0CB6-48D9-A1BE-0CD7DD886B18}" type="datetimeFigureOut">
               <a:rPr lang="zh-CN" altLang="en-US" smtClean="0"/>
-              <a:t>2018/4/19</a:t>
+              <a:t>2018/5/8</a:t>
             </a:fld>
             <a:endParaRPr lang="zh-CN" altLang="en-US"/>
           </a:p>
@@ -419,7 +419,7 @@
           <a:p>
             <a:fld id="{3CEB5F84-0CB6-48D9-A1BE-0CD7DD886B18}" type="datetimeFigureOut">
               <a:rPr lang="zh-CN" altLang="en-US" smtClean="0"/>
-              <a:t>2018/4/19</a:t>
+              <a:t>2018/5/8</a:t>
             </a:fld>
             <a:endParaRPr lang="zh-CN" altLang="en-US"/>
           </a:p>
@@ -597,7 +597,7 @@
           <a:p>
             <a:fld id="{3CEB5F84-0CB6-48D9-A1BE-0CD7DD886B18}" type="datetimeFigureOut">
               <a:rPr lang="zh-CN" altLang="en-US" smtClean="0"/>
-              <a:t>2018/4/19</a:t>
+              <a:t>2018/5/8</a:t>
             </a:fld>
             <a:endParaRPr lang="zh-CN" altLang="en-US"/>
           </a:p>
@@ -765,7 +765,7 @@
           <a:p>
             <a:fld id="{3CEB5F84-0CB6-48D9-A1BE-0CD7DD886B18}" type="datetimeFigureOut">
               <a:rPr lang="zh-CN" altLang="en-US" smtClean="0"/>
-              <a:t>2018/4/19</a:t>
+              <a:t>2018/5/8</a:t>
             </a:fld>
             <a:endParaRPr lang="zh-CN" altLang="en-US"/>
           </a:p>
@@ -1010,7 +1010,7 @@
           <a:p>
             <a:fld id="{3CEB5F84-0CB6-48D9-A1BE-0CD7DD886B18}" type="datetimeFigureOut">
               <a:rPr lang="zh-CN" altLang="en-US" smtClean="0"/>
-              <a:t>2018/4/19</a:t>
+              <a:t>2018/5/8</a:t>
             </a:fld>
             <a:endParaRPr lang="zh-CN" altLang="en-US"/>
           </a:p>
@@ -1239,7 +1239,7 @@
           <a:p>
             <a:fld id="{3CEB5F84-0CB6-48D9-A1BE-0CD7DD886B18}" type="datetimeFigureOut">
               <a:rPr lang="zh-CN" altLang="en-US" smtClean="0"/>
-              <a:t>2018/4/19</a:t>
+              <a:t>2018/5/8</a:t>
             </a:fld>
             <a:endParaRPr lang="zh-CN" altLang="en-US"/>
           </a:p>
@@ -1603,7 +1603,7 @@
           <a:p>
             <a:fld id="{3CEB5F84-0CB6-48D9-A1BE-0CD7DD886B18}" type="datetimeFigureOut">
               <a:rPr lang="zh-CN" altLang="en-US" smtClean="0"/>
-              <a:t>2018/4/19</a:t>
+              <a:t>2018/5/8</a:t>
             </a:fld>
             <a:endParaRPr lang="zh-CN" altLang="en-US"/>
           </a:p>
@@ -1720,7 +1720,7 @@
           <a:p>
             <a:fld id="{3CEB5F84-0CB6-48D9-A1BE-0CD7DD886B18}" type="datetimeFigureOut">
               <a:rPr lang="zh-CN" altLang="en-US" smtClean="0"/>
-              <a:t>2018/4/19</a:t>
+              <a:t>2018/5/8</a:t>
             </a:fld>
             <a:endParaRPr lang="zh-CN" altLang="en-US"/>
           </a:p>
@@ -1815,7 +1815,7 @@
           <a:p>
             <a:fld id="{3CEB5F84-0CB6-48D9-A1BE-0CD7DD886B18}" type="datetimeFigureOut">
               <a:rPr lang="zh-CN" altLang="en-US" smtClean="0"/>
-              <a:t>2018/4/19</a:t>
+              <a:t>2018/5/8</a:t>
             </a:fld>
             <a:endParaRPr lang="zh-CN" altLang="en-US"/>
           </a:p>
@@ -2090,7 +2090,7 @@
           <a:p>
             <a:fld id="{3CEB5F84-0CB6-48D9-A1BE-0CD7DD886B18}" type="datetimeFigureOut">
               <a:rPr lang="zh-CN" altLang="en-US" smtClean="0"/>
-              <a:t>2018/4/19</a:t>
+              <a:t>2018/5/8</a:t>
             </a:fld>
             <a:endParaRPr lang="zh-CN" altLang="en-US"/>
           </a:p>
@@ -2342,7 +2342,7 @@
           <a:p>
             <a:fld id="{3CEB5F84-0CB6-48D9-A1BE-0CD7DD886B18}" type="datetimeFigureOut">
               <a:rPr lang="zh-CN" altLang="en-US" smtClean="0"/>
-              <a:t>2018/4/19</a:t>
+              <a:t>2018/5/8</a:t>
             </a:fld>
             <a:endParaRPr lang="zh-CN" altLang="en-US"/>
           </a:p>
@@ -2553,7 +2553,7 @@
           <a:p>
             <a:fld id="{3CEB5F84-0CB6-48D9-A1BE-0CD7DD886B18}" type="datetimeFigureOut">
               <a:rPr lang="zh-CN" altLang="en-US" smtClean="0"/>
-              <a:t>2018/4/19</a:t>
+              <a:t>2018/5/8</a:t>
             </a:fld>
             <a:endParaRPr lang="zh-CN" altLang="en-US"/>
           </a:p>
@@ -2967,14 +2967,14 @@
           <p:nvPr>
             <p:extLst>
               <p:ext uri="{D42A27DB-BD31-4B8C-83A1-F6EECF244321}">
-                <p14:modId xmlns:p14="http://schemas.microsoft.com/office/powerpoint/2010/main" val="1332858727"/>
+                <p14:modId xmlns:p14="http://schemas.microsoft.com/office/powerpoint/2010/main" val="702343856"/>
               </p:ext>
             </p:extLst>
           </p:nvPr>
         </p:nvGraphicFramePr>
         <p:xfrm>
           <a:off x="982041" y="369332"/>
-          <a:ext cx="9863970" cy="6410960"/>
+          <a:ext cx="9863970" cy="6959600"/>
         </p:xfrm>
         <a:graphic>
           <a:graphicData uri="http://schemas.openxmlformats.org/drawingml/2006/table">
@@ -3616,16 +3616,29 @@
                     <a:p>
                       <a:r>
                         <a:rPr lang="en-US" altLang="zh-CN" dirty="0"/>
-                        <a:t>‘posts’:[{‘_</a:t>
-                      </a:r>
-                      <a:r>
-                        <a:rPr lang="en-US" altLang="zh-CN" dirty="0" err="1"/>
-                        <a:t>id’,’title</a:t>
-                      </a:r>
-                      <a:r>
-                        <a:rPr lang="en-US" altLang="zh-CN" dirty="0"/>
-                        <a:t>’}]</a:t>
-                      </a:r>
+                        <a:t>‘posts’:[]//posts</a:t>
+                      </a:r>
+                      <a:r>
+                        <a:rPr lang="zh-CN" altLang="en-US" dirty="0"/>
+                        <a:t>是一个</a:t>
+                      </a:r>
+                      <a:r>
+                        <a:rPr lang="en-US" altLang="zh-CN" dirty="0"/>
+                        <a:t>post</a:t>
+                      </a:r>
+                      <a:r>
+                        <a:rPr lang="zh-CN" altLang="en-US" dirty="0"/>
+                        <a:t>的数组，包含</a:t>
+                      </a:r>
+                      <a:r>
+                        <a:rPr lang="en-US" altLang="zh-CN" dirty="0"/>
+                        <a:t>post</a:t>
+                      </a:r>
+                      <a:r>
+                        <a:rPr lang="zh-CN" altLang="en-US" dirty="0"/>
+                        <a:t>所有字段</a:t>
+                      </a:r>
+                      <a:endParaRPr lang="en-US" altLang="zh-CN" dirty="0"/>
                     </a:p>
                     <a:p>
                       <a:r>
@@ -3661,7 +3674,7 @@
         </p:nvSpPr>
         <p:spPr>
           <a:xfrm>
-            <a:off x="-118360" y="5942259"/>
+            <a:off x="-118360" y="6410960"/>
             <a:ext cx="9690848" cy="369332"/>
           </a:xfrm>
           <a:prstGeom prst="rect">
@@ -5618,14 +5631,14 @@
           <p:nvPr>
             <p:extLst>
               <p:ext uri="{D42A27DB-BD31-4B8C-83A1-F6EECF244321}">
-                <p14:modId xmlns:p14="http://schemas.microsoft.com/office/powerpoint/2010/main" val="2144631450"/>
+                <p14:modId xmlns:p14="http://schemas.microsoft.com/office/powerpoint/2010/main" val="856925277"/>
               </p:ext>
             </p:extLst>
           </p:nvPr>
         </p:nvGraphicFramePr>
         <p:xfrm>
           <a:off x="519954" y="542440"/>
-          <a:ext cx="9863970" cy="1280160"/>
+          <a:ext cx="9863970" cy="1554480"/>
         </p:xfrm>
         <a:graphic>
           <a:graphicData uri="http://schemas.openxmlformats.org/drawingml/2006/table">
@@ -5817,15 +5830,27 @@
                     <a:p>
                       <a:r>
                         <a:rPr lang="en-US" altLang="zh-CN" dirty="0"/>
-                        <a:t>{‘getuserpost’:’0/1’,’posts’:[{‘_</a:t>
-                      </a:r>
-                      <a:r>
-                        <a:rPr lang="en-US" altLang="zh-CN" dirty="0" err="1"/>
-                        <a:t>id’,’title</a:t>
-                      </a:r>
-                      <a:r>
-                        <a:rPr lang="en-US" altLang="zh-CN" dirty="0"/>
-                        <a:t>’}]}</a:t>
+                        <a:t>{‘getuserpost’:’0/1’,’posts’:[{}]}//posts</a:t>
+                      </a:r>
+                      <a:r>
+                        <a:rPr lang="zh-CN" altLang="en-US" dirty="0"/>
+                        <a:t>是</a:t>
+                      </a:r>
+                      <a:r>
+                        <a:rPr lang="en-US" altLang="zh-CN" dirty="0"/>
+                        <a:t>post</a:t>
+                      </a:r>
+                      <a:r>
+                        <a:rPr lang="zh-CN" altLang="en-US" dirty="0"/>
+                        <a:t>的数组，包含</a:t>
+                      </a:r>
+                      <a:r>
+                        <a:rPr lang="en-US" altLang="zh-CN" dirty="0"/>
+                        <a:t>post</a:t>
+                      </a:r>
+                      <a:r>
+                        <a:rPr lang="zh-CN" altLang="en-US"/>
+                        <a:t>所有字段</a:t>
                       </a:r>
                       <a:endParaRPr lang="zh-CN" altLang="en-US" dirty="0"/>
                     </a:p>

</xml_diff>